<commit_message>
Update Informatikai rendszer modernizálása.pptx
</commit_message>
<xml_diff>
--- a/Informatikai rendszer modernizálása.pptx
+++ b/Informatikai rendszer modernizálása.pptx
@@ -111,7 +111,82 @@
       </a:defRPr>
     </a:lvl9pPr>
   </p:defaultTextStyle>
+  <p:extLst>
+    <p:ext uri="{EFAFB233-063F-42B5-8137-9DF3F51BA10A}">
+      <p15:sldGuideLst xmlns:p15="http://schemas.microsoft.com/office/powerpoint/2012/main"/>
+    </p:ext>
+  </p:extLst>
 </p:presentation>
+</file>
+
+<file path=ppt/changesInfos/changesInfo1.xml><?xml version="1.0" encoding="utf-8"?>
+<pc:chgInfo xmlns:a="http://schemas.openxmlformats.org/drawingml/2006/main" xmlns:r="http://schemas.openxmlformats.org/officeDocument/2006/relationships" xmlns:ac="http://schemas.microsoft.com/office/drawing/2013/main/command" xmlns:pc="http://schemas.microsoft.com/office/powerpoint/2013/main/command">
+  <pc:docChgLst>
+    <pc:chgData name="Szabolcs Wächter" userId="d5d3d40833cdb4b8" providerId="LiveId" clId="{1E1F7451-CB7D-499B-86AE-EFA19E265B65}"/>
+    <pc:docChg chg="modSld">
+      <pc:chgData name="Szabolcs Wächter" userId="d5d3d40833cdb4b8" providerId="LiveId" clId="{1E1F7451-CB7D-499B-86AE-EFA19E265B65}" dt="2023-01-19T20:45:53.986" v="82"/>
+      <pc:docMkLst>
+        <pc:docMk/>
+      </pc:docMkLst>
+      <pc:sldChg chg="modTransition">
+        <pc:chgData name="Szabolcs Wächter" userId="d5d3d40833cdb4b8" providerId="LiveId" clId="{1E1F7451-CB7D-499B-86AE-EFA19E265B65}" dt="2023-01-19T20:45:43.899" v="79"/>
+        <pc:sldMkLst>
+          <pc:docMk/>
+          <pc:sldMk cId="2017507909" sldId="256"/>
+        </pc:sldMkLst>
+      </pc:sldChg>
+      <pc:sldChg chg="modTransition">
+        <pc:chgData name="Szabolcs Wächter" userId="d5d3d40833cdb4b8" providerId="LiveId" clId="{1E1F7451-CB7D-499B-86AE-EFA19E265B65}" dt="2023-01-19T20:45:38.115" v="77"/>
+        <pc:sldMkLst>
+          <pc:docMk/>
+          <pc:sldMk cId="3243215333" sldId="257"/>
+        </pc:sldMkLst>
+      </pc:sldChg>
+      <pc:sldChg chg="modTransition">
+        <pc:chgData name="Szabolcs Wächter" userId="d5d3d40833cdb4b8" providerId="LiveId" clId="{1E1F7451-CB7D-499B-86AE-EFA19E265B65}" dt="2023-01-19T20:45:53.986" v="82"/>
+        <pc:sldMkLst>
+          <pc:docMk/>
+          <pc:sldMk cId="2211099713" sldId="258"/>
+        </pc:sldMkLst>
+      </pc:sldChg>
+      <pc:sldChg chg="modTransition">
+        <pc:chgData name="Szabolcs Wächter" userId="d5d3d40833cdb4b8" providerId="LiveId" clId="{1E1F7451-CB7D-499B-86AE-EFA19E265B65}" dt="2023-01-19T20:45:49.978" v="81"/>
+        <pc:sldMkLst>
+          <pc:docMk/>
+          <pc:sldMk cId="1761303138" sldId="259"/>
+        </pc:sldMkLst>
+      </pc:sldChg>
+      <pc:sldChg chg="modTransition">
+        <pc:chgData name="Szabolcs Wächter" userId="d5d3d40833cdb4b8" providerId="LiveId" clId="{1E1F7451-CB7D-499B-86AE-EFA19E265B65}" dt="2023-01-19T20:45:28.084" v="76"/>
+        <pc:sldMkLst>
+          <pc:docMk/>
+          <pc:sldMk cId="1626642411" sldId="260"/>
+        </pc:sldMkLst>
+      </pc:sldChg>
+      <pc:sldChg chg="modTransition">
+        <pc:chgData name="Szabolcs Wächter" userId="d5d3d40833cdb4b8" providerId="LiveId" clId="{1E1F7451-CB7D-499B-86AE-EFA19E265B65}" dt="2023-01-19T20:45:20.064" v="74"/>
+        <pc:sldMkLst>
+          <pc:docMk/>
+          <pc:sldMk cId="1987974028" sldId="261"/>
+        </pc:sldMkLst>
+      </pc:sldChg>
+      <pc:sldChg chg="modTransition">
+        <pc:chgData name="Szabolcs Wächter" userId="d5d3d40833cdb4b8" providerId="LiveId" clId="{1E1F7451-CB7D-499B-86AE-EFA19E265B65}" dt="2023-01-19T20:45:24.652" v="75"/>
+        <pc:sldMkLst>
+          <pc:docMk/>
+          <pc:sldMk cId="3296357108" sldId="262"/>
+        </pc:sldMkLst>
+      </pc:sldChg>
+      <pc:sldChg chg="modTransition">
+        <pc:chgData name="Szabolcs Wächter" userId="d5d3d40833cdb4b8" providerId="LiveId" clId="{1E1F7451-CB7D-499B-86AE-EFA19E265B65}" dt="2023-01-19T20:45:45.250" v="80"/>
+        <pc:sldMkLst>
+          <pc:docMk/>
+          <pc:sldMk cId="1645690888" sldId="263"/>
+        </pc:sldMkLst>
+      </pc:sldChg>
+    </pc:docChg>
+  </pc:docChgLst>
+</pc:chgInfo>
 </file>
 
 <file path=ppt/slideLayouts/slideLayout1.xml><?xml version="1.0" encoding="utf-8"?>
@@ -263,7 +338,7 @@
           <a:p>
             <a:fld id="{0A108456-424C-4347-9B09-73B763F82A76}" type="datetimeFigureOut">
               <a:rPr lang="hu-HU" smtClean="0"/>
-              <a:t>2023. 01. 18.</a:t>
+              <a:t>2023. 01. 19.</a:t>
             </a:fld>
             <a:endParaRPr lang="hu-HU"/>
           </a:p>
@@ -463,7 +538,7 @@
           <a:p>
             <a:fld id="{0A108456-424C-4347-9B09-73B763F82A76}" type="datetimeFigureOut">
               <a:rPr lang="hu-HU" smtClean="0"/>
-              <a:t>2023. 01. 18.</a:t>
+              <a:t>2023. 01. 19.</a:t>
             </a:fld>
             <a:endParaRPr lang="hu-HU"/>
           </a:p>
@@ -673,7 +748,7 @@
           <a:p>
             <a:fld id="{0A108456-424C-4347-9B09-73B763F82A76}" type="datetimeFigureOut">
               <a:rPr lang="hu-HU" smtClean="0"/>
-              <a:t>2023. 01. 18.</a:t>
+              <a:t>2023. 01. 19.</a:t>
             </a:fld>
             <a:endParaRPr lang="hu-HU"/>
           </a:p>
@@ -873,7 +948,7 @@
           <a:p>
             <a:fld id="{0A108456-424C-4347-9B09-73B763F82A76}" type="datetimeFigureOut">
               <a:rPr lang="hu-HU" smtClean="0"/>
-              <a:t>2023. 01. 18.</a:t>
+              <a:t>2023. 01. 19.</a:t>
             </a:fld>
             <a:endParaRPr lang="hu-HU"/>
           </a:p>
@@ -1149,7 +1224,7 @@
           <a:p>
             <a:fld id="{0A108456-424C-4347-9B09-73B763F82A76}" type="datetimeFigureOut">
               <a:rPr lang="hu-HU" smtClean="0"/>
-              <a:t>2023. 01. 18.</a:t>
+              <a:t>2023. 01. 19.</a:t>
             </a:fld>
             <a:endParaRPr lang="hu-HU"/>
           </a:p>
@@ -1417,7 +1492,7 @@
           <a:p>
             <a:fld id="{0A108456-424C-4347-9B09-73B763F82A76}" type="datetimeFigureOut">
               <a:rPr lang="hu-HU" smtClean="0"/>
-              <a:t>2023. 01. 18.</a:t>
+              <a:t>2023. 01. 19.</a:t>
             </a:fld>
             <a:endParaRPr lang="hu-HU"/>
           </a:p>
@@ -1832,7 +1907,7 @@
           <a:p>
             <a:fld id="{0A108456-424C-4347-9B09-73B763F82A76}" type="datetimeFigureOut">
               <a:rPr lang="hu-HU" smtClean="0"/>
-              <a:t>2023. 01. 18.</a:t>
+              <a:t>2023. 01. 19.</a:t>
             </a:fld>
             <a:endParaRPr lang="hu-HU"/>
           </a:p>
@@ -1974,7 +2049,7 @@
           <a:p>
             <a:fld id="{0A108456-424C-4347-9B09-73B763F82A76}" type="datetimeFigureOut">
               <a:rPr lang="hu-HU" smtClean="0"/>
-              <a:t>2023. 01. 18.</a:t>
+              <a:t>2023. 01. 19.</a:t>
             </a:fld>
             <a:endParaRPr lang="hu-HU"/>
           </a:p>
@@ -2087,7 +2162,7 @@
           <a:p>
             <a:fld id="{0A108456-424C-4347-9B09-73B763F82A76}" type="datetimeFigureOut">
               <a:rPr lang="hu-HU" smtClean="0"/>
-              <a:t>2023. 01. 18.</a:t>
+              <a:t>2023. 01. 19.</a:t>
             </a:fld>
             <a:endParaRPr lang="hu-HU"/>
           </a:p>
@@ -2400,7 +2475,7 @@
           <a:p>
             <a:fld id="{0A108456-424C-4347-9B09-73B763F82A76}" type="datetimeFigureOut">
               <a:rPr lang="hu-HU" smtClean="0"/>
-              <a:t>2023. 01. 18.</a:t>
+              <a:t>2023. 01. 19.</a:t>
             </a:fld>
             <a:endParaRPr lang="hu-HU"/>
           </a:p>
@@ -2689,7 +2764,7 @@
           <a:p>
             <a:fld id="{0A108456-424C-4347-9B09-73B763F82A76}" type="datetimeFigureOut">
               <a:rPr lang="hu-HU" smtClean="0"/>
-              <a:t>2023. 01. 18.</a:t>
+              <a:t>2023. 01. 19.</a:t>
             </a:fld>
             <a:endParaRPr lang="hu-HU"/>
           </a:p>
@@ -2992,7 +3067,7 @@
           <a:p>
             <a:fld id="{0A108456-424C-4347-9B09-73B763F82A76}" type="datetimeFigureOut">
               <a:rPr lang="hu-HU" smtClean="0"/>
-              <a:t>2023. 01. 18.</a:t>
+              <a:t>2023. 01. 19.</a:t>
             </a:fld>
             <a:endParaRPr lang="hu-HU"/>
           </a:p>
@@ -3541,6 +3616,18 @@
   <p:clrMapOvr>
     <a:masterClrMapping/>
   </p:clrMapOvr>
+  <mc:AlternateContent xmlns:mc="http://schemas.openxmlformats.org/markup-compatibility/2006">
+    <mc:Choice xmlns:p15="http://schemas.microsoft.com/office/powerpoint/2012/main" Requires="p15">
+      <p:transition xmlns:p14="http://schemas.microsoft.com/office/powerpoint/2010/main" spd="slow" p14:dur="6000" advTm="10000">
+        <p15:prstTrans prst="curtains"/>
+      </p:transition>
+    </mc:Choice>
+    <mc:Fallback>
+      <p:transition spd="slow" advTm="10000">
+        <p:fade/>
+      </p:transition>
+    </mc:Fallback>
+  </mc:AlternateContent>
 </p:sld>
 </file>
 
@@ -3786,6 +3873,18 @@
   <p:clrMapOvr>
     <a:masterClrMapping/>
   </p:clrMapOvr>
+  <mc:AlternateContent xmlns:mc="http://schemas.openxmlformats.org/markup-compatibility/2006">
+    <mc:Choice xmlns:p14="http://schemas.microsoft.com/office/powerpoint/2010/main" Requires="p14">
+      <p:transition spd="med" p14:dur="700" advTm="10000">
+        <p:fade/>
+      </p:transition>
+    </mc:Choice>
+    <mc:Fallback>
+      <p:transition spd="med" advTm="10000">
+        <p:fade/>
+      </p:transition>
+    </mc:Fallback>
+  </mc:AlternateContent>
 </p:sld>
 </file>
 
@@ -3930,6 +4029,18 @@
   <p:clrMapOvr>
     <a:masterClrMapping/>
   </p:clrMapOvr>
+  <mc:AlternateContent xmlns:mc="http://schemas.openxmlformats.org/markup-compatibility/2006">
+    <mc:Choice xmlns:p15="http://schemas.microsoft.com/office/powerpoint/2012/main" Requires="p15">
+      <p:transition xmlns:p14="http://schemas.microsoft.com/office/powerpoint/2010/main" spd="slow" p14:dur="2000" advTm="0">
+        <p15:prstTrans prst="drape"/>
+      </p:transition>
+    </mc:Choice>
+    <mc:Fallback>
+      <p:transition spd="slow" advTm="0">
+        <p:fade/>
+      </p:transition>
+    </mc:Fallback>
+  </mc:AlternateContent>
 </p:sld>
 </file>
 
@@ -4091,6 +4202,18 @@
   <p:clrMapOvr>
     <a:masterClrMapping/>
   </p:clrMapOvr>
+  <mc:AlternateContent xmlns:mc="http://schemas.openxmlformats.org/markup-compatibility/2006">
+    <mc:Choice xmlns:p15="http://schemas.microsoft.com/office/powerpoint/2012/main" Requires="p15">
+      <p:transition xmlns:p14="http://schemas.microsoft.com/office/powerpoint/2010/main" spd="slow" p14:dur="2000">
+        <p15:prstTrans prst="drape"/>
+      </p:transition>
+    </mc:Choice>
+    <mc:Fallback>
+      <p:transition spd="slow">
+        <p:fade/>
+      </p:transition>
+    </mc:Fallback>
+  </mc:AlternateContent>
 </p:sld>
 </file>
 
@@ -4231,6 +4354,18 @@
   <p:clrMapOvr>
     <a:masterClrMapping/>
   </p:clrMapOvr>
+  <mc:AlternateContent xmlns:mc="http://schemas.openxmlformats.org/markup-compatibility/2006">
+    <mc:Choice xmlns:p15="http://schemas.microsoft.com/office/powerpoint/2012/main" Requires="p15">
+      <p:transition xmlns:p14="http://schemas.microsoft.com/office/powerpoint/2010/main" spd="slow" p14:dur="2000">
+        <p15:prstTrans prst="drape"/>
+      </p:transition>
+    </mc:Choice>
+    <mc:Fallback>
+      <p:transition spd="slow">
+        <p:fade/>
+      </p:transition>
+    </mc:Fallback>
+  </mc:AlternateContent>
 </p:sld>
 </file>
 
@@ -4326,6 +4461,18 @@
   <p:clrMapOvr>
     <a:masterClrMapping/>
   </p:clrMapOvr>
+  <mc:AlternateContent xmlns:mc="http://schemas.openxmlformats.org/markup-compatibility/2006">
+    <mc:Choice xmlns:p14="http://schemas.microsoft.com/office/powerpoint/2010/main" Requires="p14">
+      <p:transition spd="med" p14:dur="700" advTm="10000">
+        <p:fade/>
+      </p:transition>
+    </mc:Choice>
+    <mc:Fallback>
+      <p:transition spd="med" advTm="10000">
+        <p:fade/>
+      </p:transition>
+    </mc:Fallback>
+  </mc:AlternateContent>
 </p:sld>
 </file>
 
@@ -4409,6 +4556,18 @@
   <p:clrMapOvr>
     <a:masterClrMapping/>
   </p:clrMapOvr>
+  <mc:AlternateContent xmlns:mc="http://schemas.openxmlformats.org/markup-compatibility/2006">
+    <mc:Choice xmlns:p14="http://schemas.microsoft.com/office/powerpoint/2010/main" Requires="p14">
+      <p:transition spd="med" p14:dur="700" advTm="10000">
+        <p:fade/>
+      </p:transition>
+    </mc:Choice>
+    <mc:Fallback>
+      <p:transition spd="med" advTm="10000">
+        <p:fade/>
+      </p:transition>
+    </mc:Fallback>
+  </mc:AlternateContent>
 </p:sld>
 </file>
 
@@ -4473,6 +4632,18 @@
   <p:clrMapOvr>
     <a:masterClrMapping/>
   </p:clrMapOvr>
+  <mc:AlternateContent xmlns:mc="http://schemas.openxmlformats.org/markup-compatibility/2006">
+    <mc:Choice xmlns:p14="http://schemas.microsoft.com/office/powerpoint/2010/main" Requires="p14">
+      <p:transition spd="med" p14:dur="700" advTm="10000">
+        <p:fade/>
+      </p:transition>
+    </mc:Choice>
+    <mc:Fallback>
+      <p:transition spd="med" advTm="10000">
+        <p:fade/>
+      </p:transition>
+    </mc:Fallback>
+  </mc:AlternateContent>
 </p:sld>
 </file>
 

</xml_diff>